<commit_message>
diapositiva avance, diccionario + sort
</commit_message>
<xml_diff>
--- a/documentacion/FASE 1 (PROYECTO MIPS).pptx
+++ b/documentacion/FASE 1 (PROYECTO MIPS).pptx
@@ -8,7 +8,13 @@
     <p:sldId id="256" r:id="rId2"/>
     <p:sldId id="257" r:id="rId3"/>
     <p:sldId id="258" r:id="rId4"/>
-    <p:sldId id="259" r:id="rId5"/>
+    <p:sldId id="260" r:id="rId5"/>
+    <p:sldId id="261" r:id="rId6"/>
+    <p:sldId id="262" r:id="rId7"/>
+    <p:sldId id="263" r:id="rId8"/>
+    <p:sldId id="264" r:id="rId9"/>
+    <p:sldId id="265" r:id="rId10"/>
+    <p:sldId id="259" r:id="rId11"/>
   </p:sldIdLst>
   <p:sldSz cx="12192000" cy="6858000"/>
   <p:notesSz cx="6858000" cy="9144000"/>
@@ -107,6 +113,11 @@
       </a:defRPr>
     </a:lvl9pPr>
   </p:defaultTextStyle>
+  <p:extLst>
+    <p:ext uri="{EFAFB233-063F-42B5-8137-9DF3F51BA10A}">
+      <p15:sldGuideLst xmlns:p15="http://schemas.microsoft.com/office/powerpoint/2012/main"/>
+    </p:ext>
+  </p:extLst>
 </p:presentation>
 </file>
 
@@ -446,7 +457,7 @@
             <a:fld id="{5923F103-BC34-4FE4-A40E-EDDEECFDA5D0}" type="datetimeFigureOut">
               <a:rPr lang="en-US" dirty="0"/>
               <a:pPr/>
-              <a:t>5/7/2020</a:t>
+              <a:t>5/14/2020</a:t>
             </a:fld>
             <a:endParaRPr lang="en-US" dirty="0"/>
           </a:p>
@@ -1530,7 +1541,7 @@
           <a:p>
             <a:fld id="{923A1CC3-2375-41D4-9E03-427CAF2A4C1A}" type="datetimeFigureOut">
               <a:rPr lang="en-US" dirty="0"/>
-              <a:t>5/7/2020</a:t>
+              <a:t>5/14/2020</a:t>
             </a:fld>
             <a:endParaRPr lang="en-US" dirty="0"/>
           </a:p>
@@ -2506,7 +2517,7 @@
           <a:p>
             <a:fld id="{AFF16868-8199-4C2C-A5B1-63AEE139F88E}" type="datetimeFigureOut">
               <a:rPr lang="en-US" dirty="0"/>
-              <a:t>5/7/2020</a:t>
+              <a:t>5/14/2020</a:t>
             </a:fld>
             <a:endParaRPr lang="en-US" dirty="0"/>
           </a:p>
@@ -3636,7 +3647,7 @@
           <a:p>
             <a:fld id="{AAD9FF7F-6988-44CC-821B-644E70CD2F73}" type="datetimeFigureOut">
               <a:rPr lang="en-US" dirty="0"/>
-              <a:t>5/7/2020</a:t>
+              <a:t>5/14/2020</a:t>
             </a:fld>
             <a:endParaRPr lang="en-US" dirty="0"/>
           </a:p>
@@ -4665,7 +4676,7 @@
           <a:p>
             <a:fld id="{5C12C299-16B2-4475-990D-751901EACC14}" type="datetimeFigureOut">
               <a:rPr lang="en-US" dirty="0"/>
-              <a:t>5/7/2020</a:t>
+              <a:t>5/14/2020</a:t>
             </a:fld>
             <a:endParaRPr lang="en-US" dirty="0"/>
           </a:p>
@@ -5321,7 +5332,7 @@
           <a:p>
             <a:fld id="{9FE86839-B9D8-4651-8783-F325ECE74E65}" type="datetimeFigureOut">
               <a:rPr lang="en-US" dirty="0"/>
-              <a:t>5/7/2020</a:t>
+              <a:t>5/14/2020</a:t>
             </a:fld>
             <a:endParaRPr lang="en-US" dirty="0"/>
           </a:p>
@@ -6178,7 +6189,7 @@
           <a:p>
             <a:fld id="{FD484F64-32F6-45C5-931F-ADC1662401D0}" type="datetimeFigureOut">
               <a:rPr lang="en-US" dirty="0"/>
-              <a:t>5/7/2020</a:t>
+              <a:t>5/14/2020</a:t>
             </a:fld>
             <a:endParaRPr lang="en-US" dirty="0"/>
           </a:p>
@@ -6364,7 +6375,7 @@
           <a:p>
             <a:fld id="{53086D93-FCAC-47E0-A2EE-787E62CA814C}" type="datetimeFigureOut">
               <a:rPr lang="en-US" dirty="0"/>
-              <a:t>5/7/2020</a:t>
+              <a:t>5/14/2020</a:t>
             </a:fld>
             <a:endParaRPr lang="en-US" dirty="0"/>
           </a:p>
@@ -7332,7 +7343,7 @@
           <a:p>
             <a:fld id="{CDA879A6-0FD0-4734-A311-86BFCA472E6E}" type="datetimeFigureOut">
               <a:rPr lang="en-US" dirty="0"/>
-              <a:t>5/7/2020</a:t>
+              <a:t>5/14/2020</a:t>
             </a:fld>
             <a:endParaRPr lang="en-US" dirty="0"/>
           </a:p>
@@ -7539,7 +7550,7 @@
           <a:p>
             <a:fld id="{19C9CA7B-DFD4-44B5-8C60-D14B8CD1FB59}" type="datetimeFigureOut">
               <a:rPr lang="en-US" dirty="0"/>
-              <a:t>5/7/2020</a:t>
+              <a:t>5/14/2020</a:t>
             </a:fld>
             <a:endParaRPr lang="en-US" dirty="0"/>
           </a:p>
@@ -8569,7 +8580,7 @@
           <a:p>
             <a:fld id="{F34E6425-0181-43F2-84FC-787E803FD2F8}" type="datetimeFigureOut">
               <a:rPr lang="en-US" dirty="0"/>
-              <a:t>5/7/2020</a:t>
+              <a:t>5/14/2020</a:t>
             </a:fld>
             <a:endParaRPr lang="en-US" dirty="0"/>
           </a:p>
@@ -8837,7 +8848,7 @@
           <a:p>
             <a:fld id="{3BDB8791-F1B0-41E7-B7FD-A781E65C4266}" type="datetimeFigureOut">
               <a:rPr lang="en-US" dirty="0"/>
-              <a:t>5/7/2020</a:t>
+              <a:t>5/14/2020</a:t>
             </a:fld>
             <a:endParaRPr lang="en-US" dirty="0"/>
           </a:p>
@@ -9243,7 +9254,7 @@
           <a:p>
             <a:fld id="{5FDD63B2-E120-4ED8-B27B-C685F510A5FE}" type="datetimeFigureOut">
               <a:rPr lang="en-US" dirty="0"/>
-              <a:t>5/7/2020</a:t>
+              <a:t>5/14/2020</a:t>
             </a:fld>
             <a:endParaRPr lang="en-US" dirty="0"/>
           </a:p>
@@ -9366,7 +9377,7 @@
           <a:p>
             <a:fld id="{7AA18ACC-A947-437B-A130-35BD54FDF1E9}" type="datetimeFigureOut">
               <a:rPr lang="en-US" dirty="0"/>
-              <a:t>5/7/2020</a:t>
+              <a:t>5/14/2020</a:t>
             </a:fld>
             <a:endParaRPr lang="en-US" dirty="0"/>
           </a:p>
@@ -9457,7 +9468,7 @@
           <a:p>
             <a:fld id="{7C8D7E02-BCB8-4D50-A234-369438C08659}" type="datetimeFigureOut">
               <a:rPr lang="en-US" dirty="0"/>
-              <a:t>5/7/2020</a:t>
+              <a:t>5/14/2020</a:t>
             </a:fld>
             <a:endParaRPr lang="en-US" dirty="0"/>
           </a:p>
@@ -10534,7 +10545,7 @@
           <a:p>
             <a:fld id="{76E86A4C-8E40-4F87-A4F0-01A0687C5742}" type="datetimeFigureOut">
               <a:rPr lang="en-US" dirty="0"/>
-              <a:t>5/7/2020</a:t>
+              <a:t>5/14/2020</a:t>
             </a:fld>
             <a:endParaRPr lang="en-US" dirty="0"/>
           </a:p>
@@ -11638,7 +11649,7 @@
           <a:p>
             <a:fld id="{35E72C73-2D91-4E12-BA25-F0AA0C03599B}" type="datetimeFigureOut">
               <a:rPr lang="en-US" dirty="0"/>
-              <a:t>5/7/2020</a:t>
+              <a:t>5/14/2020</a:t>
             </a:fld>
             <a:endParaRPr lang="en-US" dirty="0"/>
           </a:p>
@@ -12631,7 +12642,7 @@
           <a:p>
             <a:fld id="{2BE451C3-0FF4-47C4-B829-773ADF60F88C}" type="datetimeFigureOut">
               <a:rPr lang="en-US" dirty="0"/>
-              <a:t>5/7/2020</a:t>
+              <a:t>5/14/2020</a:t>
             </a:fld>
             <a:endParaRPr lang="en-US" dirty="0"/>
           </a:p>
@@ -13210,7 +13221,7 @@
           <a:p>
             <a:r>
               <a:rPr lang="es-MX" dirty="0"/>
-              <a:t>FASE 1 (PROYECTO MIPS)	</a:t>
+              <a:t>FASE 1 Y 2 (PROYECTO MIPS)	</a:t>
             </a:r>
           </a:p>
         </p:txBody>
@@ -13264,6 +13275,119 @@
     <p:extLst>
       <p:ext uri="{BB962C8B-B14F-4D97-AF65-F5344CB8AC3E}">
         <p14:creationId xmlns:p14="http://schemas.microsoft.com/office/powerpoint/2010/main" val="3641281976"/>
+      </p:ext>
+    </p:extLst>
+  </p:cSld>
+  <p:clrMapOvr>
+    <a:masterClrMapping/>
+  </p:clrMapOvr>
+</p:sld>
+</file>
+
+<file path=ppt/slides/slide10.xml><?xml version="1.0" encoding="utf-8"?>
+<p:sld xmlns:a="http://schemas.openxmlformats.org/drawingml/2006/main" xmlns:r="http://schemas.openxmlformats.org/officeDocument/2006/relationships" xmlns:p="http://schemas.openxmlformats.org/presentationml/2006/main">
+  <p:cSld>
+    <p:spTree>
+      <p:nvGrpSpPr>
+        <p:cNvPr id="1" name=""/>
+        <p:cNvGrpSpPr/>
+        <p:nvPr/>
+      </p:nvGrpSpPr>
+      <p:grpSpPr>
+        <a:xfrm>
+          <a:off x="0" y="0"/>
+          <a:ext cx="0" cy="0"/>
+          <a:chOff x="0" y="0"/>
+          <a:chExt cx="0" cy="0"/>
+        </a:xfrm>
+      </p:grpSpPr>
+      <p:sp>
+        <p:nvSpPr>
+          <p:cNvPr id="2" name="Título 1">
+            <a:extLst>
+              <a:ext uri="{FF2B5EF4-FFF2-40B4-BE49-F238E27FC236}">
+                <a16:creationId xmlns:a16="http://schemas.microsoft.com/office/drawing/2014/main" id="{B161CCD9-0D80-4DA8-9881-71D2609B4D62}"/>
+              </a:ext>
+            </a:extLst>
+          </p:cNvPr>
+          <p:cNvSpPr>
+            <a:spLocks noGrp="1"/>
+          </p:cNvSpPr>
+          <p:nvPr>
+            <p:ph type="title"/>
+          </p:nvPr>
+        </p:nvSpPr>
+        <p:spPr/>
+        <p:txBody>
+          <a:bodyPr/>
+          <a:lstStyle/>
+          <a:p>
+            <a:r>
+              <a:rPr lang="es-MX" dirty="0"/>
+              <a:t>Opciones de ensamblador</a:t>
+            </a:r>
+          </a:p>
+        </p:txBody>
+      </p:sp>
+      <p:sp>
+        <p:nvSpPr>
+          <p:cNvPr id="3" name="Marcador de contenido 2">
+            <a:extLst>
+              <a:ext uri="{FF2B5EF4-FFF2-40B4-BE49-F238E27FC236}">
+                <a16:creationId xmlns:a16="http://schemas.microsoft.com/office/drawing/2014/main" id="{6E2566E6-87D6-4A49-BF79-9A64B37F62CC}"/>
+              </a:ext>
+            </a:extLst>
+          </p:cNvPr>
+          <p:cNvSpPr>
+            <a:spLocks noGrp="1"/>
+          </p:cNvSpPr>
+          <p:nvPr>
+            <p:ph idx="1"/>
+          </p:nvPr>
+        </p:nvSpPr>
+        <p:spPr/>
+        <p:txBody>
+          <a:bodyPr/>
+          <a:lstStyle/>
+          <a:p>
+            <a:r>
+              <a:rPr lang="es-MX" dirty="0"/>
+              <a:t>Números perfectos</a:t>
+            </a:r>
+          </a:p>
+          <a:p>
+            <a:r>
+              <a:rPr lang="es-MX" dirty="0"/>
+              <a:t>Máximo común divisor</a:t>
+            </a:r>
+          </a:p>
+          <a:p>
+            <a:r>
+              <a:rPr lang="es-MX" dirty="0"/>
+              <a:t>Detectar el tipo de triángulo</a:t>
+            </a:r>
+          </a:p>
+          <a:p>
+            <a:r>
+              <a:rPr lang="es-MX" dirty="0" err="1"/>
+              <a:t>Selective</a:t>
+            </a:r>
+            <a:r>
+              <a:rPr lang="es-MX" dirty="0"/>
+              <a:t> </a:t>
+            </a:r>
+            <a:r>
+              <a:rPr lang="es-MX" dirty="0" err="1"/>
+              <a:t>sort</a:t>
+            </a:r>
+            <a:endParaRPr lang="es-MX" dirty="0"/>
+          </a:p>
+        </p:txBody>
+      </p:sp>
+    </p:spTree>
+    <p:extLst>
+      <p:ext uri="{BB962C8B-B14F-4D97-AF65-F5344CB8AC3E}">
+        <p14:creationId xmlns:p14="http://schemas.microsoft.com/office/powerpoint/2010/main" val="990397110"/>
       </p:ext>
     </p:extLst>
   </p:cSld>
@@ -13315,7 +13439,10 @@
               <a:rPr lang="es-MX" dirty="0" err="1"/>
               <a:t>Datapath</a:t>
             </a:r>
-            <a:endParaRPr lang="es-MX" dirty="0"/>
+            <a:r>
+              <a:rPr lang="es-MX" dirty="0"/>
+              <a:t> Fase 1</a:t>
+            </a:r>
           </a:p>
         </p:txBody>
       </p:sp>
@@ -13444,7 +13571,7 @@
           <p:cNvPr id="2" name="Título 1">
             <a:extLst>
               <a:ext uri="{FF2B5EF4-FFF2-40B4-BE49-F238E27FC236}">
-                <a16:creationId xmlns:a16="http://schemas.microsoft.com/office/drawing/2014/main" id="{B161CCD9-0D80-4DA8-9881-71D2609B4D62}"/>
+                <a16:creationId xmlns:a16="http://schemas.microsoft.com/office/drawing/2014/main" id="{D223E682-2C1F-4632-BAD7-D11491A5EF20}"/>
               </a:ext>
             </a:extLst>
           </p:cNvPr>
@@ -13462,7 +13589,7 @@
           <a:p>
             <a:r>
               <a:rPr lang="es-MX" dirty="0"/>
-              <a:t>Opciones de ensamblador</a:t>
+              <a:t>Resumen Fase 1</a:t>
             </a:r>
           </a:p>
         </p:txBody>
@@ -13472,7 +13599,7 @@
           <p:cNvPr id="3" name="Marcador de contenido 2">
             <a:extLst>
               <a:ext uri="{FF2B5EF4-FFF2-40B4-BE49-F238E27FC236}">
-                <a16:creationId xmlns:a16="http://schemas.microsoft.com/office/drawing/2014/main" id="{6E2566E6-87D6-4A49-BF79-9A64B37F62CC}"/>
+                <a16:creationId xmlns:a16="http://schemas.microsoft.com/office/drawing/2014/main" id="{EA7F3D0D-7BFF-460A-BAA1-07CC1DA8C0C0}"/>
               </a:ext>
             </a:extLst>
           </p:cNvPr>
@@ -13490,34 +13617,10 @@
           <a:p>
             <a:r>
               <a:rPr lang="es-MX" dirty="0"/>
-              <a:t>Números perfectos</a:t>
+              <a:t>En esta fase únicamente podemos utilizar instrucciones de tipo R y no contamos con una memoria por lo que no es posible guardar los resultados más que en registros.</a:t>
             </a:r>
           </a:p>
           <a:p>
-            <a:r>
-              <a:rPr lang="es-MX" dirty="0"/>
-              <a:t>Máximo común divisor</a:t>
-            </a:r>
-          </a:p>
-          <a:p>
-            <a:r>
-              <a:rPr lang="es-MX" dirty="0"/>
-              <a:t>Detectar el tipo de triángulo</a:t>
-            </a:r>
-          </a:p>
-          <a:p>
-            <a:r>
-              <a:rPr lang="es-MX" dirty="0" err="1"/>
-              <a:t>Selective</a:t>
-            </a:r>
-            <a:r>
-              <a:rPr lang="es-MX" dirty="0"/>
-              <a:t> </a:t>
-            </a:r>
-            <a:r>
-              <a:rPr lang="es-MX" dirty="0" err="1"/>
-              <a:t>sort</a:t>
-            </a:r>
             <a:endParaRPr lang="es-MX" dirty="0"/>
           </a:p>
         </p:txBody>
@@ -13525,7 +13628,667 @@
     </p:spTree>
     <p:extLst>
       <p:ext uri="{BB962C8B-B14F-4D97-AF65-F5344CB8AC3E}">
-        <p14:creationId xmlns:p14="http://schemas.microsoft.com/office/powerpoint/2010/main" val="990397110"/>
+        <p14:creationId xmlns:p14="http://schemas.microsoft.com/office/powerpoint/2010/main" val="3722742907"/>
+      </p:ext>
+    </p:extLst>
+  </p:cSld>
+  <p:clrMapOvr>
+    <a:masterClrMapping/>
+  </p:clrMapOvr>
+</p:sld>
+</file>
+
+<file path=ppt/slides/slide5.xml><?xml version="1.0" encoding="utf-8"?>
+<p:sld xmlns:a="http://schemas.openxmlformats.org/drawingml/2006/main" xmlns:r="http://schemas.openxmlformats.org/officeDocument/2006/relationships" xmlns:p="http://schemas.openxmlformats.org/presentationml/2006/main">
+  <p:cSld>
+    <p:spTree>
+      <p:nvGrpSpPr>
+        <p:cNvPr id="1" name=""/>
+        <p:cNvGrpSpPr/>
+        <p:nvPr/>
+      </p:nvGrpSpPr>
+      <p:grpSpPr>
+        <a:xfrm>
+          <a:off x="0" y="0"/>
+          <a:ext cx="0" cy="0"/>
+          <a:chOff x="0" y="0"/>
+          <a:chExt cx="0" cy="0"/>
+        </a:xfrm>
+      </p:grpSpPr>
+      <p:sp>
+        <p:nvSpPr>
+          <p:cNvPr id="2" name="Título 1">
+            <a:extLst>
+              <a:ext uri="{FF2B5EF4-FFF2-40B4-BE49-F238E27FC236}">
+                <a16:creationId xmlns:a16="http://schemas.microsoft.com/office/drawing/2014/main" id="{B0170B12-F69D-4CF5-A4E0-98658847964B}"/>
+              </a:ext>
+            </a:extLst>
+          </p:cNvPr>
+          <p:cNvSpPr>
+            <a:spLocks noGrp="1"/>
+          </p:cNvSpPr>
+          <p:nvPr>
+            <p:ph type="title"/>
+          </p:nvPr>
+        </p:nvSpPr>
+        <p:spPr/>
+        <p:txBody>
+          <a:bodyPr/>
+          <a:lstStyle/>
+          <a:p>
+            <a:r>
+              <a:rPr lang="es-MX" dirty="0"/>
+              <a:t>Resultados fase 1</a:t>
+            </a:r>
+          </a:p>
+        </p:txBody>
+      </p:sp>
+      <p:sp>
+        <p:nvSpPr>
+          <p:cNvPr id="3" name="Marcador de contenido 2">
+            <a:extLst>
+              <a:ext uri="{FF2B5EF4-FFF2-40B4-BE49-F238E27FC236}">
+                <a16:creationId xmlns:a16="http://schemas.microsoft.com/office/drawing/2014/main" id="{C32EF728-51E8-4618-9E4D-8F7A529175B2}"/>
+              </a:ext>
+            </a:extLst>
+          </p:cNvPr>
+          <p:cNvSpPr>
+            <a:spLocks noGrp="1"/>
+          </p:cNvSpPr>
+          <p:nvPr>
+            <p:ph idx="1"/>
+          </p:nvPr>
+        </p:nvSpPr>
+        <p:spPr/>
+        <p:txBody>
+          <a:bodyPr/>
+          <a:lstStyle/>
+          <a:p>
+            <a:r>
+              <a:rPr lang="es-MX" dirty="0"/>
+              <a:t>Se subió unos archivos para probar esta fase y tuvimos estos resultados.</a:t>
+            </a:r>
+          </a:p>
+          <a:p>
+            <a:endParaRPr lang="es-MX" dirty="0"/>
+          </a:p>
+          <a:p>
+            <a:endParaRPr lang="es-MX" dirty="0"/>
+          </a:p>
+          <a:p>
+            <a:r>
+              <a:rPr lang="es-MX" dirty="0"/>
+              <a:t>Los cuales concuerdan con los indicados en </a:t>
+            </a:r>
+            <a:r>
+              <a:rPr lang="es-MX" dirty="0" err="1"/>
+              <a:t>moodle</a:t>
+            </a:r>
+            <a:endParaRPr lang="es-MX" dirty="0"/>
+          </a:p>
+        </p:txBody>
+      </p:sp>
+      <p:pic>
+        <p:nvPicPr>
+          <p:cNvPr id="4" name="Imagen 3">
+            <a:extLst>
+              <a:ext uri="{FF2B5EF4-FFF2-40B4-BE49-F238E27FC236}">
+                <a16:creationId xmlns:a16="http://schemas.microsoft.com/office/drawing/2014/main" id="{2CA67C63-1F46-4760-8157-32D3F9AB8E46}"/>
+              </a:ext>
+            </a:extLst>
+          </p:cNvPr>
+          <p:cNvPicPr>
+            <a:picLocks noChangeAspect="1"/>
+          </p:cNvPicPr>
+          <p:nvPr/>
+        </p:nvPicPr>
+        <p:blipFill>
+          <a:blip r:embed="rId2"/>
+          <a:stretch>
+            <a:fillRect/>
+          </a:stretch>
+        </p:blipFill>
+        <p:spPr>
+          <a:xfrm>
+            <a:off x="1638300" y="2950740"/>
+            <a:ext cx="4457700" cy="704850"/>
+          </a:xfrm>
+          <a:prstGeom prst="rect">
+            <a:avLst/>
+          </a:prstGeom>
+        </p:spPr>
+      </p:pic>
+      <p:pic>
+        <p:nvPicPr>
+          <p:cNvPr id="5" name="Imagen 4">
+            <a:extLst>
+              <a:ext uri="{FF2B5EF4-FFF2-40B4-BE49-F238E27FC236}">
+                <a16:creationId xmlns:a16="http://schemas.microsoft.com/office/drawing/2014/main" id="{DB86F0D6-B23C-4C49-A288-26832E3F59B8}"/>
+              </a:ext>
+            </a:extLst>
+          </p:cNvPr>
+          <p:cNvPicPr>
+            <a:picLocks noChangeAspect="1"/>
+          </p:cNvPicPr>
+          <p:nvPr/>
+        </p:nvPicPr>
+        <p:blipFill>
+          <a:blip r:embed="rId3"/>
+          <a:stretch>
+            <a:fillRect/>
+          </a:stretch>
+        </p:blipFill>
+        <p:spPr>
+          <a:xfrm>
+            <a:off x="1638300" y="4311650"/>
+            <a:ext cx="1609725" cy="1362075"/>
+          </a:xfrm>
+          <a:prstGeom prst="rect">
+            <a:avLst/>
+          </a:prstGeom>
+        </p:spPr>
+      </p:pic>
+    </p:spTree>
+    <p:extLst>
+      <p:ext uri="{BB962C8B-B14F-4D97-AF65-F5344CB8AC3E}">
+        <p14:creationId xmlns:p14="http://schemas.microsoft.com/office/powerpoint/2010/main" val="4173194514"/>
+      </p:ext>
+    </p:extLst>
+  </p:cSld>
+  <p:clrMapOvr>
+    <a:masterClrMapping/>
+  </p:clrMapOvr>
+</p:sld>
+</file>
+
+<file path=ppt/slides/slide6.xml><?xml version="1.0" encoding="utf-8"?>
+<p:sld xmlns:a="http://schemas.openxmlformats.org/drawingml/2006/main" xmlns:r="http://schemas.openxmlformats.org/officeDocument/2006/relationships" xmlns:p="http://schemas.openxmlformats.org/presentationml/2006/main">
+  <p:cSld>
+    <p:spTree>
+      <p:nvGrpSpPr>
+        <p:cNvPr id="1" name=""/>
+        <p:cNvGrpSpPr/>
+        <p:nvPr/>
+      </p:nvGrpSpPr>
+      <p:grpSpPr>
+        <a:xfrm>
+          <a:off x="0" y="0"/>
+          <a:ext cx="0" cy="0"/>
+          <a:chOff x="0" y="0"/>
+          <a:chExt cx="0" cy="0"/>
+        </a:xfrm>
+      </p:grpSpPr>
+      <p:sp>
+        <p:nvSpPr>
+          <p:cNvPr id="2" name="Título 1">
+            <a:extLst>
+              <a:ext uri="{FF2B5EF4-FFF2-40B4-BE49-F238E27FC236}">
+                <a16:creationId xmlns:a16="http://schemas.microsoft.com/office/drawing/2014/main" id="{C4664572-380B-4A6C-802D-D0DBD68CBFE1}"/>
+              </a:ext>
+            </a:extLst>
+          </p:cNvPr>
+          <p:cNvSpPr>
+            <a:spLocks noGrp="1"/>
+          </p:cNvSpPr>
+          <p:nvPr>
+            <p:ph type="title"/>
+          </p:nvPr>
+        </p:nvSpPr>
+        <p:spPr/>
+        <p:txBody>
+          <a:bodyPr/>
+          <a:lstStyle/>
+          <a:p>
+            <a:r>
+              <a:rPr lang="es-MX" dirty="0" err="1"/>
+              <a:t>Datapath</a:t>
+            </a:r>
+            <a:r>
+              <a:rPr lang="es-MX" dirty="0"/>
+              <a:t> fase 2</a:t>
+            </a:r>
+          </a:p>
+        </p:txBody>
+      </p:sp>
+      <p:pic>
+        <p:nvPicPr>
+          <p:cNvPr id="5" name="Marcador de contenido 4" descr="Imagen que contiene mapa, cuarto&#10;&#10;Descripción generada automáticamente">
+            <a:extLst>
+              <a:ext uri="{FF2B5EF4-FFF2-40B4-BE49-F238E27FC236}">
+                <a16:creationId xmlns:a16="http://schemas.microsoft.com/office/drawing/2014/main" id="{55F1DAA7-8B4D-4D8D-A73A-A1F65548B25F}"/>
+              </a:ext>
+            </a:extLst>
+          </p:cNvPr>
+          <p:cNvPicPr>
+            <a:picLocks noGrp="1" noChangeAspect="1"/>
+          </p:cNvPicPr>
+          <p:nvPr>
+            <p:ph idx="1"/>
+          </p:nvPr>
+        </p:nvPicPr>
+        <p:blipFill>
+          <a:blip r:embed="rId2"/>
+          <a:stretch>
+            <a:fillRect/>
+          </a:stretch>
+        </p:blipFill>
+        <p:spPr>
+          <a:xfrm>
+            <a:off x="678384" y="2028182"/>
+            <a:ext cx="11147406" cy="3856150"/>
+          </a:xfrm>
+        </p:spPr>
+      </p:pic>
+    </p:spTree>
+    <p:extLst>
+      <p:ext uri="{BB962C8B-B14F-4D97-AF65-F5344CB8AC3E}">
+        <p14:creationId xmlns:p14="http://schemas.microsoft.com/office/powerpoint/2010/main" val="3382188396"/>
+      </p:ext>
+    </p:extLst>
+  </p:cSld>
+  <p:clrMapOvr>
+    <a:masterClrMapping/>
+  </p:clrMapOvr>
+</p:sld>
+</file>
+
+<file path=ppt/slides/slide7.xml><?xml version="1.0" encoding="utf-8"?>
+<p:sld xmlns:a="http://schemas.openxmlformats.org/drawingml/2006/main" xmlns:r="http://schemas.openxmlformats.org/officeDocument/2006/relationships" xmlns:p="http://schemas.openxmlformats.org/presentationml/2006/main">
+  <p:cSld>
+    <p:spTree>
+      <p:nvGrpSpPr>
+        <p:cNvPr id="1" name=""/>
+        <p:cNvGrpSpPr/>
+        <p:nvPr/>
+      </p:nvGrpSpPr>
+      <p:grpSpPr>
+        <a:xfrm>
+          <a:off x="0" y="0"/>
+          <a:ext cx="0" cy="0"/>
+          <a:chOff x="0" y="0"/>
+          <a:chExt cx="0" cy="0"/>
+        </a:xfrm>
+      </p:grpSpPr>
+      <p:sp>
+        <p:nvSpPr>
+          <p:cNvPr id="2" name="Título 1">
+            <a:extLst>
+              <a:ext uri="{FF2B5EF4-FFF2-40B4-BE49-F238E27FC236}">
+                <a16:creationId xmlns:a16="http://schemas.microsoft.com/office/drawing/2014/main" id="{FF3CE42C-1C47-4480-81EB-7FD846B16C1B}"/>
+              </a:ext>
+            </a:extLst>
+          </p:cNvPr>
+          <p:cNvSpPr>
+            <a:spLocks noGrp="1"/>
+          </p:cNvSpPr>
+          <p:nvPr>
+            <p:ph type="title"/>
+          </p:nvPr>
+        </p:nvSpPr>
+        <p:spPr/>
+        <p:txBody>
+          <a:bodyPr/>
+          <a:lstStyle/>
+          <a:p>
+            <a:r>
+              <a:rPr lang="es-MX" dirty="0"/>
+              <a:t>Resumen fase 2</a:t>
+            </a:r>
+          </a:p>
+        </p:txBody>
+      </p:sp>
+      <p:sp>
+        <p:nvSpPr>
+          <p:cNvPr id="3" name="Marcador de contenido 2">
+            <a:extLst>
+              <a:ext uri="{FF2B5EF4-FFF2-40B4-BE49-F238E27FC236}">
+                <a16:creationId xmlns:a16="http://schemas.microsoft.com/office/drawing/2014/main" id="{71293B58-EF6F-4634-AEF6-3295E7228A53}"/>
+              </a:ext>
+            </a:extLst>
+          </p:cNvPr>
+          <p:cNvSpPr>
+            <a:spLocks noGrp="1"/>
+          </p:cNvSpPr>
+          <p:nvPr>
+            <p:ph idx="1"/>
+          </p:nvPr>
+        </p:nvSpPr>
+        <p:spPr/>
+        <p:txBody>
+          <a:bodyPr/>
+          <a:lstStyle/>
+          <a:p>
+            <a:r>
+              <a:rPr lang="es-MX" dirty="0"/>
+              <a:t>En esta fase se añaden módulos para shift, extender de señal y otros módulos como la memoria.</a:t>
+            </a:r>
+          </a:p>
+          <a:p>
+            <a:r>
+              <a:rPr lang="es-MX" dirty="0"/>
+              <a:t>Con estos módulos es posible crear </a:t>
+            </a:r>
+            <a:r>
+              <a:rPr lang="es-MX" dirty="0" err="1"/>
+              <a:t>branches</a:t>
+            </a:r>
+            <a:r>
+              <a:rPr lang="es-MX" dirty="0"/>
+              <a:t> y también hacer uso de la memoria de datos.</a:t>
+            </a:r>
+          </a:p>
+          <a:p>
+            <a:r>
+              <a:rPr lang="es-MX" dirty="0"/>
+              <a:t>Las instrucciones añadidas son ADDI, SLTI, ANDI, ORI, SW, LW, BEQ.</a:t>
+            </a:r>
+          </a:p>
+          <a:p>
+            <a:pPr marL="0" indent="0">
+              <a:buNone/>
+            </a:pPr>
+            <a:endParaRPr lang="es-MX" dirty="0"/>
+          </a:p>
+        </p:txBody>
+      </p:sp>
+    </p:spTree>
+    <p:extLst>
+      <p:ext uri="{BB962C8B-B14F-4D97-AF65-F5344CB8AC3E}">
+        <p14:creationId xmlns:p14="http://schemas.microsoft.com/office/powerpoint/2010/main" val="223227869"/>
+      </p:ext>
+    </p:extLst>
+  </p:cSld>
+  <p:clrMapOvr>
+    <a:masterClrMapping/>
+  </p:clrMapOvr>
+</p:sld>
+</file>
+
+<file path=ppt/slides/slide8.xml><?xml version="1.0" encoding="utf-8"?>
+<p:sld xmlns:a="http://schemas.openxmlformats.org/drawingml/2006/main" xmlns:r="http://schemas.openxmlformats.org/officeDocument/2006/relationships" xmlns:p="http://schemas.openxmlformats.org/presentationml/2006/main">
+  <p:cSld>
+    <p:spTree>
+      <p:nvGrpSpPr>
+        <p:cNvPr id="1" name=""/>
+        <p:cNvGrpSpPr/>
+        <p:nvPr/>
+      </p:nvGrpSpPr>
+      <p:grpSpPr>
+        <a:xfrm>
+          <a:off x="0" y="0"/>
+          <a:ext cx="0" cy="0"/>
+          <a:chOff x="0" y="0"/>
+          <a:chExt cx="0" cy="0"/>
+        </a:xfrm>
+      </p:grpSpPr>
+      <p:sp>
+        <p:nvSpPr>
+          <p:cNvPr id="2" name="Título 1">
+            <a:extLst>
+              <a:ext uri="{FF2B5EF4-FFF2-40B4-BE49-F238E27FC236}">
+                <a16:creationId xmlns:a16="http://schemas.microsoft.com/office/drawing/2014/main" id="{EF44A4ED-AB47-4080-AF68-128BBF921C73}"/>
+              </a:ext>
+            </a:extLst>
+          </p:cNvPr>
+          <p:cNvSpPr>
+            <a:spLocks noGrp="1"/>
+          </p:cNvSpPr>
+          <p:nvPr>
+            <p:ph type="title"/>
+          </p:nvPr>
+        </p:nvSpPr>
+        <p:spPr/>
+        <p:txBody>
+          <a:bodyPr/>
+          <a:lstStyle/>
+          <a:p>
+            <a:r>
+              <a:rPr lang="es-MX" dirty="0"/>
+              <a:t>Resultados fase 2</a:t>
+            </a:r>
+          </a:p>
+        </p:txBody>
+      </p:sp>
+      <p:sp>
+        <p:nvSpPr>
+          <p:cNvPr id="3" name="Marcador de contenido 2">
+            <a:extLst>
+              <a:ext uri="{FF2B5EF4-FFF2-40B4-BE49-F238E27FC236}">
+                <a16:creationId xmlns:a16="http://schemas.microsoft.com/office/drawing/2014/main" id="{5F048434-8AD5-41CD-B3C3-50A77E9F98D4}"/>
+              </a:ext>
+            </a:extLst>
+          </p:cNvPr>
+          <p:cNvSpPr>
+            <a:spLocks noGrp="1"/>
+          </p:cNvSpPr>
+          <p:nvPr>
+            <p:ph idx="1"/>
+          </p:nvPr>
+        </p:nvSpPr>
+        <p:spPr/>
+        <p:txBody>
+          <a:bodyPr/>
+          <a:lstStyle/>
+          <a:p>
+            <a:r>
+              <a:rPr lang="es-MX" dirty="0"/>
+              <a:t>Y estos fueron los resultados de la fase </a:t>
+            </a:r>
+          </a:p>
+          <a:p>
+            <a:endParaRPr lang="es-MX" dirty="0"/>
+          </a:p>
+          <a:p>
+            <a:endParaRPr lang="es-MX" dirty="0"/>
+          </a:p>
+          <a:p>
+            <a:pPr marL="0" indent="0">
+              <a:buNone/>
+            </a:pPr>
+            <a:r>
+              <a:rPr lang="es-MX" dirty="0"/>
+              <a:t>Registro                           									Memoria</a:t>
+            </a:r>
+          </a:p>
+        </p:txBody>
+      </p:sp>
+      <p:pic>
+        <p:nvPicPr>
+          <p:cNvPr id="4" name="Imagen 3">
+            <a:extLst>
+              <a:ext uri="{FF2B5EF4-FFF2-40B4-BE49-F238E27FC236}">
+                <a16:creationId xmlns:a16="http://schemas.microsoft.com/office/drawing/2014/main" id="{43110BB6-90F1-4308-A032-CF591752A627}"/>
+              </a:ext>
+            </a:extLst>
+          </p:cNvPr>
+          <p:cNvPicPr>
+            <a:picLocks noChangeAspect="1"/>
+          </p:cNvPicPr>
+          <p:nvPr/>
+        </p:nvPicPr>
+        <p:blipFill>
+          <a:blip r:embed="rId2"/>
+          <a:stretch>
+            <a:fillRect/>
+          </a:stretch>
+        </p:blipFill>
+        <p:spPr>
+          <a:xfrm>
+            <a:off x="949573" y="3038475"/>
+            <a:ext cx="4973056" cy="600575"/>
+          </a:xfrm>
+          <a:prstGeom prst="rect">
+            <a:avLst/>
+          </a:prstGeom>
+        </p:spPr>
+      </p:pic>
+      <p:pic>
+        <p:nvPicPr>
+          <p:cNvPr id="5" name="Imagen 4">
+            <a:extLst>
+              <a:ext uri="{FF2B5EF4-FFF2-40B4-BE49-F238E27FC236}">
+                <a16:creationId xmlns:a16="http://schemas.microsoft.com/office/drawing/2014/main" id="{ACC4DF36-557C-477C-A405-6149A5997564}"/>
+              </a:ext>
+            </a:extLst>
+          </p:cNvPr>
+          <p:cNvPicPr>
+            <a:picLocks noChangeAspect="1"/>
+          </p:cNvPicPr>
+          <p:nvPr/>
+        </p:nvPicPr>
+        <p:blipFill>
+          <a:blip r:embed="rId3"/>
+          <a:stretch>
+            <a:fillRect/>
+          </a:stretch>
+        </p:blipFill>
+        <p:spPr>
+          <a:xfrm>
+            <a:off x="6954412" y="2803395"/>
+            <a:ext cx="2961955" cy="835655"/>
+          </a:xfrm>
+          <a:prstGeom prst="rect">
+            <a:avLst/>
+          </a:prstGeom>
+        </p:spPr>
+      </p:pic>
+      <p:pic>
+        <p:nvPicPr>
+          <p:cNvPr id="1026" name="Picture 2">
+            <a:extLst>
+              <a:ext uri="{FF2B5EF4-FFF2-40B4-BE49-F238E27FC236}">
+                <a16:creationId xmlns:a16="http://schemas.microsoft.com/office/drawing/2014/main" id="{E00880E4-038B-4948-B1AD-CD89A62A6FFC}"/>
+              </a:ext>
+            </a:extLst>
+          </p:cNvPr>
+          <p:cNvPicPr>
+            <a:picLocks noChangeAspect="1" noChangeArrowheads="1"/>
+          </p:cNvPicPr>
+          <p:nvPr/>
+        </p:nvPicPr>
+        <p:blipFill>
+          <a:blip r:embed="rId4">
+            <a:extLst>
+              <a:ext uri="{28A0092B-C50C-407E-A947-70E740481C1C}">
+                <a14:useLocalDpi xmlns:a14="http://schemas.microsoft.com/office/drawing/2010/main" val="0"/>
+              </a:ext>
+            </a:extLst>
+          </a:blip>
+          <a:srcRect/>
+          <a:stretch>
+            <a:fillRect/>
+          </a:stretch>
+        </p:blipFill>
+        <p:spPr bwMode="auto">
+          <a:xfrm>
+            <a:off x="1154954" y="4804567"/>
+            <a:ext cx="3841685" cy="1650208"/>
+          </a:xfrm>
+          <a:prstGeom prst="rect">
+            <a:avLst/>
+          </a:prstGeom>
+          <a:noFill/>
+          <a:extLst>
+            <a:ext uri="{909E8E84-426E-40DD-AFC4-6F175D3DCCD1}">
+              <a14:hiddenFill xmlns:a14="http://schemas.microsoft.com/office/drawing/2010/main">
+                <a:solidFill>
+                  <a:srgbClr val="FFFFFF"/>
+                </a:solidFill>
+              </a14:hiddenFill>
+            </a:ext>
+          </a:extLst>
+        </p:spPr>
+      </p:pic>
+    </p:spTree>
+    <p:extLst>
+      <p:ext uri="{BB962C8B-B14F-4D97-AF65-F5344CB8AC3E}">
+        <p14:creationId xmlns:p14="http://schemas.microsoft.com/office/powerpoint/2010/main" val="1253033131"/>
+      </p:ext>
+    </p:extLst>
+  </p:cSld>
+  <p:clrMapOvr>
+    <a:masterClrMapping/>
+  </p:clrMapOvr>
+</p:sld>
+</file>
+
+<file path=ppt/slides/slide9.xml><?xml version="1.0" encoding="utf-8"?>
+<p:sld xmlns:a="http://schemas.openxmlformats.org/drawingml/2006/main" xmlns:r="http://schemas.openxmlformats.org/officeDocument/2006/relationships" xmlns:p="http://schemas.openxmlformats.org/presentationml/2006/main">
+  <p:cSld>
+    <p:spTree>
+      <p:nvGrpSpPr>
+        <p:cNvPr id="1" name=""/>
+        <p:cNvGrpSpPr/>
+        <p:nvPr/>
+      </p:nvGrpSpPr>
+      <p:grpSpPr>
+        <a:xfrm>
+          <a:off x="0" y="0"/>
+          <a:ext cx="0" cy="0"/>
+          <a:chOff x="0" y="0"/>
+          <a:chExt cx="0" cy="0"/>
+        </a:xfrm>
+      </p:grpSpPr>
+      <p:sp>
+        <p:nvSpPr>
+          <p:cNvPr id="2" name="Título 1">
+            <a:extLst>
+              <a:ext uri="{FF2B5EF4-FFF2-40B4-BE49-F238E27FC236}">
+                <a16:creationId xmlns:a16="http://schemas.microsoft.com/office/drawing/2014/main" id="{47B7C3C2-1C4E-42BB-9D41-75CD22CA8CE4}"/>
+              </a:ext>
+            </a:extLst>
+          </p:cNvPr>
+          <p:cNvSpPr>
+            <a:spLocks noGrp="1"/>
+          </p:cNvSpPr>
+          <p:nvPr>
+            <p:ph type="title"/>
+          </p:nvPr>
+        </p:nvSpPr>
+        <p:spPr/>
+        <p:txBody>
+          <a:bodyPr/>
+          <a:lstStyle/>
+          <a:p>
+            <a:r>
+              <a:rPr lang="es-MX" dirty="0"/>
+              <a:t>Investigación</a:t>
+            </a:r>
+          </a:p>
+        </p:txBody>
+      </p:sp>
+      <p:sp>
+        <p:nvSpPr>
+          <p:cNvPr id="3" name="Marcador de contenido 2">
+            <a:extLst>
+              <a:ext uri="{FF2B5EF4-FFF2-40B4-BE49-F238E27FC236}">
+                <a16:creationId xmlns:a16="http://schemas.microsoft.com/office/drawing/2014/main" id="{74647C8A-0BCC-4FFA-B825-D23E7AE36B3F}"/>
+              </a:ext>
+            </a:extLst>
+          </p:cNvPr>
+          <p:cNvSpPr>
+            <a:spLocks noGrp="1"/>
+          </p:cNvSpPr>
+          <p:nvPr>
+            <p:ph idx="1"/>
+          </p:nvPr>
+        </p:nvSpPr>
+        <p:spPr/>
+        <p:txBody>
+          <a:bodyPr/>
+          <a:lstStyle/>
+          <a:p>
+            <a:pPr marL="0" indent="0">
+              <a:buNone/>
+            </a:pPr>
+            <a:endParaRPr lang="es-MX" dirty="0"/>
+          </a:p>
+        </p:txBody>
+      </p:sp>
+    </p:spTree>
+    <p:extLst>
+      <p:ext uri="{BB962C8B-B14F-4D97-AF65-F5344CB8AC3E}">
+        <p14:creationId xmlns:p14="http://schemas.microsoft.com/office/powerpoint/2010/main" val="262089354"/>
       </p:ext>
     </p:extLst>
   </p:cSld>

</xml_diff>